<commit_message>
Added QR code to the github repo
</commit_message>
<xml_diff>
--- a/Operations Research.pptx
+++ b/Operations Research.pptx
@@ -10479,6 +10479,42 @@
           <a:xfrm>
             <a:off x="-222128" y="-201933"/>
             <a:ext cx="2136272" cy="2216383"/>
+          </a:xfrm>
+          <a:prstGeom prst="rect">
+            <a:avLst/>
+          </a:prstGeom>
+        </p:spPr>
+      </p:pic>
+      <p:pic>
+        <p:nvPicPr>
+          <p:cNvPr id="3" name="Picture 2">
+            <a:extLst>
+              <a:ext uri="{FF2B5EF4-FFF2-40B4-BE49-F238E27FC236}">
+                <a16:creationId xmlns:a16="http://schemas.microsoft.com/office/drawing/2014/main" id="{EC3383FE-5444-0201-287F-C42AEFED5762}"/>
+              </a:ext>
+            </a:extLst>
+          </p:cNvPr>
+          <p:cNvPicPr>
+            <a:picLocks noChangeAspect="1"/>
+          </p:cNvPicPr>
+          <p:nvPr/>
+        </p:nvPicPr>
+        <p:blipFill>
+          <a:blip r:embed="rId4">
+            <a:extLst>
+              <a:ext uri="{28A0092B-C50C-407E-A947-70E740481C1C}">
+                <a14:useLocalDpi xmlns:a14="http://schemas.microsoft.com/office/drawing/2010/main" val="0"/>
+              </a:ext>
+            </a:extLst>
+          </a:blip>
+          <a:stretch>
+            <a:fillRect/>
+          </a:stretch>
+        </p:blipFill>
+        <p:spPr>
+          <a:xfrm>
+            <a:off x="7049869" y="906258"/>
+            <a:ext cx="4286250" cy="4286250"/>
           </a:xfrm>
           <a:prstGeom prst="rect">
             <a:avLst/>

</xml_diff>